<commit_message>
Agregando xmind actualizado con roles
</commit_message>
<xml_diff>
--- a/Documentos/Administración de Proyecto/01 - Reunion 11 sep 23 - Kick off & role definition.pptx
+++ b/Documentos/Administración de Proyecto/01 - Reunion 11 sep 23 - Kick off & role definition.pptx
@@ -132,7 +132,7 @@
   <pc:docChgLst>
     <pc:chgData name="Campos-Chavez, Carlos" userId="af2eaea1-5597-4de4-bd71-3505bc9091f0" providerId="ADAL" clId="{3FC90BC9-4C01-4FC5-8CB4-F2C74B9152B3}"/>
     <pc:docChg chg="undo custSel addSld modSld sldOrd">
-      <pc:chgData name="Campos-Chavez, Carlos" userId="af2eaea1-5597-4de4-bd71-3505bc9091f0" providerId="ADAL" clId="{3FC90BC9-4C01-4FC5-8CB4-F2C74B9152B3}" dt="2023-09-12T13:53:14.785" v="614" actId="1076"/>
+      <pc:chgData name="Campos-Chavez, Carlos" userId="af2eaea1-5597-4de4-bd71-3505bc9091f0" providerId="ADAL" clId="{3FC90BC9-4C01-4FC5-8CB4-F2C74B9152B3}" dt="2023-09-14T15:41:59.728" v="615" actId="13926"/>
       <pc:docMkLst>
         <pc:docMk/>
       </pc:docMkLst>
@@ -235,7 +235,7 @@
         </pc:spChg>
       </pc:sldChg>
       <pc:sldChg chg="modSp add mod">
-        <pc:chgData name="Campos-Chavez, Carlos" userId="af2eaea1-5597-4de4-bd71-3505bc9091f0" providerId="ADAL" clId="{3FC90BC9-4C01-4FC5-8CB4-F2C74B9152B3}" dt="2023-09-12T13:53:14.785" v="614" actId="1076"/>
+        <pc:chgData name="Campos-Chavez, Carlos" userId="af2eaea1-5597-4de4-bd71-3505bc9091f0" providerId="ADAL" clId="{3FC90BC9-4C01-4FC5-8CB4-F2C74B9152B3}" dt="2023-09-14T15:41:59.728" v="615" actId="13926"/>
         <pc:sldMkLst>
           <pc:docMk/>
           <pc:sldMk cId="2461975162" sldId="263"/>
@@ -249,7 +249,7 @@
           </ac:spMkLst>
         </pc:spChg>
         <pc:spChg chg="mod">
-          <ac:chgData name="Campos-Chavez, Carlos" userId="af2eaea1-5597-4de4-bd71-3505bc9091f0" providerId="ADAL" clId="{3FC90BC9-4C01-4FC5-8CB4-F2C74B9152B3}" dt="2023-09-12T13:53:14.785" v="614" actId="1076"/>
+          <ac:chgData name="Campos-Chavez, Carlos" userId="af2eaea1-5597-4de4-bd71-3505bc9091f0" providerId="ADAL" clId="{3FC90BC9-4C01-4FC5-8CB4-F2C74B9152B3}" dt="2023-09-14T15:41:59.728" v="615" actId="13926"/>
           <ac:spMkLst>
             <pc:docMk/>
             <pc:sldMk cId="2461975162" sldId="263"/>
@@ -412,7 +412,7 @@
             <a:fld id="{73C3BD54-29B9-3D42-B178-776ED395AA85}" type="datetimeFigureOut">
               <a:rPr lang="en-US" smtClean="0"/>
               <a:pPr/>
-              <a:t>9/12/2023</a:t>
+              <a:t>9/14/2023</a:t>
             </a:fld>
             <a:endParaRPr lang="en-US" sz="1400"/>
           </a:p>
@@ -612,7 +612,7 @@
           <a:p>
             <a:fld id="{73C3BD54-29B9-3D42-B178-776ED395AA85}" type="datetimeFigureOut">
               <a:rPr lang="en-US" smtClean="0"/>
-              <a:t>9/12/2023</a:t>
+              <a:t>9/14/2023</a:t>
             </a:fld>
             <a:endParaRPr lang="en-US"/>
           </a:p>
@@ -822,7 +822,7 @@
           <a:p>
             <a:fld id="{73C3BD54-29B9-3D42-B178-776ED395AA85}" type="datetimeFigureOut">
               <a:rPr lang="en-US" smtClean="0"/>
-              <a:t>9/12/2023</a:t>
+              <a:t>9/14/2023</a:t>
             </a:fld>
             <a:endParaRPr lang="en-US"/>
           </a:p>
@@ -1022,7 +1022,7 @@
           <a:p>
             <a:fld id="{73C3BD54-29B9-3D42-B178-776ED395AA85}" type="datetimeFigureOut">
               <a:rPr lang="en-US" smtClean="0"/>
-              <a:t>9/12/2023</a:t>
+              <a:t>9/14/2023</a:t>
             </a:fld>
             <a:endParaRPr lang="en-US"/>
           </a:p>
@@ -1298,7 +1298,7 @@
           <a:p>
             <a:fld id="{73C3BD54-29B9-3D42-B178-776ED395AA85}" type="datetimeFigureOut">
               <a:rPr lang="en-US" smtClean="0"/>
-              <a:t>9/12/2023</a:t>
+              <a:t>9/14/2023</a:t>
             </a:fld>
             <a:endParaRPr lang="en-US"/>
           </a:p>
@@ -1566,7 +1566,7 @@
           <a:p>
             <a:fld id="{73C3BD54-29B9-3D42-B178-776ED395AA85}" type="datetimeFigureOut">
               <a:rPr lang="en-US" smtClean="0"/>
-              <a:t>9/12/2023</a:t>
+              <a:t>9/14/2023</a:t>
             </a:fld>
             <a:endParaRPr lang="en-US"/>
           </a:p>
@@ -1981,7 +1981,7 @@
           <a:p>
             <a:fld id="{73C3BD54-29B9-3D42-B178-776ED395AA85}" type="datetimeFigureOut">
               <a:rPr lang="en-US" smtClean="0"/>
-              <a:t>9/12/2023</a:t>
+              <a:t>9/14/2023</a:t>
             </a:fld>
             <a:endParaRPr lang="en-US"/>
           </a:p>
@@ -2123,7 +2123,7 @@
           <a:p>
             <a:fld id="{73C3BD54-29B9-3D42-B178-776ED395AA85}" type="datetimeFigureOut">
               <a:rPr lang="en-US" smtClean="0"/>
-              <a:t>9/12/2023</a:t>
+              <a:t>9/14/2023</a:t>
             </a:fld>
             <a:endParaRPr lang="en-US"/>
           </a:p>
@@ -2236,7 +2236,7 @@
           <a:p>
             <a:fld id="{73C3BD54-29B9-3D42-B178-776ED395AA85}" type="datetimeFigureOut">
               <a:rPr lang="en-US" smtClean="0"/>
-              <a:t>9/12/2023</a:t>
+              <a:t>9/14/2023</a:t>
             </a:fld>
             <a:endParaRPr lang="en-US"/>
           </a:p>
@@ -2549,7 +2549,7 @@
           <a:p>
             <a:fld id="{73C3BD54-29B9-3D42-B178-776ED395AA85}" type="datetimeFigureOut">
               <a:rPr lang="en-US" smtClean="0"/>
-              <a:t>9/12/2023</a:t>
+              <a:t>9/14/2023</a:t>
             </a:fld>
             <a:endParaRPr lang="en-US"/>
           </a:p>
@@ -2838,7 +2838,7 @@
           <a:p>
             <a:fld id="{73C3BD54-29B9-3D42-B178-776ED395AA85}" type="datetimeFigureOut">
               <a:rPr lang="en-US" smtClean="0"/>
-              <a:t>9/12/2023</a:t>
+              <a:t>9/14/2023</a:t>
             </a:fld>
             <a:endParaRPr lang="en-US"/>
           </a:p>
@@ -3082,7 +3082,7 @@
             <a:fld id="{73C3BD54-29B9-3D42-B178-776ED395AA85}" type="datetimeFigureOut">
               <a:rPr lang="en-US" smtClean="0"/>
               <a:pPr/>
-              <a:t>9/12/2023</a:t>
+              <a:t>9/14/2023</a:t>
             </a:fld>
             <a:endParaRPr lang="en-US" dirty="0"/>
           </a:p>
@@ -5097,37 +5097,69 @@
           </a:p>
           <a:p>
             <a:r>
-              <a:rPr lang="es-MX" sz="1800" dirty="0"/>
+              <a:rPr lang="es-MX" sz="1800" dirty="0">
+                <a:highlight>
+                  <a:srgbClr val="00FF00"/>
+                </a:highlight>
+              </a:rPr>
               <a:t>Poner </a:t>
             </a:r>
             <a:r>
-              <a:rPr lang="es-MX" sz="1800" dirty="0" err="1"/>
+              <a:rPr lang="es-MX" sz="1800" dirty="0" err="1">
+                <a:highlight>
+                  <a:srgbClr val="00FF00"/>
+                </a:highlight>
+              </a:rPr>
               <a:t>xmind</a:t>
             </a:r>
             <a:r>
-              <a:rPr lang="es-MX" sz="1800" dirty="0"/>
+              <a:rPr lang="es-MX" sz="1800" dirty="0">
+                <a:highlight>
+                  <a:srgbClr val="00FF00"/>
+                </a:highlight>
+              </a:rPr>
               <a:t> en repo y pasar link </a:t>
             </a:r>
           </a:p>
           <a:p>
             <a:r>
-              <a:rPr lang="es-MX" sz="1800" dirty="0"/>
+              <a:rPr lang="es-MX" sz="1800" dirty="0">
+                <a:highlight>
+                  <a:srgbClr val="00FF00"/>
+                </a:highlight>
+              </a:rPr>
               <a:t>En </a:t>
             </a:r>
             <a:r>
-              <a:rPr lang="es-MX" sz="1800" dirty="0" err="1"/>
+              <a:rPr lang="es-MX" sz="1800" dirty="0" err="1">
+                <a:highlight>
+                  <a:srgbClr val="00FF00"/>
+                </a:highlight>
+              </a:rPr>
               <a:t>xmind</a:t>
             </a:r>
             <a:r>
-              <a:rPr lang="es-MX" sz="1800" dirty="0"/>
+              <a:rPr lang="es-MX" sz="1800" dirty="0">
+                <a:highlight>
+                  <a:srgbClr val="00FF00"/>
+                </a:highlight>
+              </a:rPr>
               <a:t> poner </a:t>
             </a:r>
             <a:r>
-              <a:rPr lang="es-MX" sz="1800" dirty="0" err="1"/>
+              <a:rPr lang="es-MX" sz="1800" dirty="0" err="1">
+                <a:highlight>
+                  <a:srgbClr val="00FF00"/>
+                </a:highlight>
+              </a:rPr>
               <a:t>codigo</a:t>
             </a:r>
             <a:r>
-              <a:rPr lang="es-MX" sz="1800" dirty="0"/>
+              <a:rPr lang="es-MX" sz="1800" dirty="0">
+                <a:highlight>
+                  <a:srgbClr val="00FF00"/>
+                </a:highlight>
+              </a:rPr>
               <a:t> de colores para responsables </a:t>
             </a:r>
           </a:p>

</xml_diff>

<commit_message>
Agregando link de NavQPlus
</commit_message>
<xml_diff>
--- a/Documentos/Administración de Proyecto/01 - Reunion 11 sep 23 - Kick off & role definition.pptx
+++ b/Documentos/Administración de Proyecto/01 - Reunion 11 sep 23 - Kick off & role definition.pptx
@@ -132,7 +132,7 @@
   <pc:docChgLst>
     <pc:chgData name="Campos-Chavez, Carlos" userId="af2eaea1-5597-4de4-bd71-3505bc9091f0" providerId="ADAL" clId="{3FC90BC9-4C01-4FC5-8CB4-F2C74B9152B3}"/>
     <pc:docChg chg="undo custSel addSld modSld sldOrd">
-      <pc:chgData name="Campos-Chavez, Carlos" userId="af2eaea1-5597-4de4-bd71-3505bc9091f0" providerId="ADAL" clId="{3FC90BC9-4C01-4FC5-8CB4-F2C74B9152B3}" dt="2023-09-14T15:41:59.728" v="615" actId="13926"/>
+      <pc:chgData name="Campos-Chavez, Carlos" userId="af2eaea1-5597-4de4-bd71-3505bc9091f0" providerId="ADAL" clId="{3FC90BC9-4C01-4FC5-8CB4-F2C74B9152B3}" dt="2023-09-15T17:26:59.379" v="617" actId="13926"/>
       <pc:docMkLst>
         <pc:docMk/>
       </pc:docMkLst>
@@ -235,7 +235,7 @@
         </pc:spChg>
       </pc:sldChg>
       <pc:sldChg chg="modSp add mod">
-        <pc:chgData name="Campos-Chavez, Carlos" userId="af2eaea1-5597-4de4-bd71-3505bc9091f0" providerId="ADAL" clId="{3FC90BC9-4C01-4FC5-8CB4-F2C74B9152B3}" dt="2023-09-14T15:41:59.728" v="615" actId="13926"/>
+        <pc:chgData name="Campos-Chavez, Carlos" userId="af2eaea1-5597-4de4-bd71-3505bc9091f0" providerId="ADAL" clId="{3FC90BC9-4C01-4FC5-8CB4-F2C74B9152B3}" dt="2023-09-15T17:26:59.379" v="617" actId="13926"/>
         <pc:sldMkLst>
           <pc:docMk/>
           <pc:sldMk cId="2461975162" sldId="263"/>
@@ -249,7 +249,7 @@
           </ac:spMkLst>
         </pc:spChg>
         <pc:spChg chg="mod">
-          <ac:chgData name="Campos-Chavez, Carlos" userId="af2eaea1-5597-4de4-bd71-3505bc9091f0" providerId="ADAL" clId="{3FC90BC9-4C01-4FC5-8CB4-F2C74B9152B3}" dt="2023-09-14T15:41:59.728" v="615" actId="13926"/>
+          <ac:chgData name="Campos-Chavez, Carlos" userId="af2eaea1-5597-4de4-bd71-3505bc9091f0" providerId="ADAL" clId="{3FC90BC9-4C01-4FC5-8CB4-F2C74B9152B3}" dt="2023-09-15T17:26:59.379" v="617" actId="13926"/>
           <ac:spMkLst>
             <pc:docMk/>
             <pc:sldMk cId="2461975162" sldId="263"/>
@@ -412,7 +412,7 @@
             <a:fld id="{73C3BD54-29B9-3D42-B178-776ED395AA85}" type="datetimeFigureOut">
               <a:rPr lang="en-US" smtClean="0"/>
               <a:pPr/>
-              <a:t>9/14/2023</a:t>
+              <a:t>9/15/2023</a:t>
             </a:fld>
             <a:endParaRPr lang="en-US" sz="1400"/>
           </a:p>
@@ -612,7 +612,7 @@
           <a:p>
             <a:fld id="{73C3BD54-29B9-3D42-B178-776ED395AA85}" type="datetimeFigureOut">
               <a:rPr lang="en-US" smtClean="0"/>
-              <a:t>9/14/2023</a:t>
+              <a:t>9/15/2023</a:t>
             </a:fld>
             <a:endParaRPr lang="en-US"/>
           </a:p>
@@ -822,7 +822,7 @@
           <a:p>
             <a:fld id="{73C3BD54-29B9-3D42-B178-776ED395AA85}" type="datetimeFigureOut">
               <a:rPr lang="en-US" smtClean="0"/>
-              <a:t>9/14/2023</a:t>
+              <a:t>9/15/2023</a:t>
             </a:fld>
             <a:endParaRPr lang="en-US"/>
           </a:p>
@@ -1022,7 +1022,7 @@
           <a:p>
             <a:fld id="{73C3BD54-29B9-3D42-B178-776ED395AA85}" type="datetimeFigureOut">
               <a:rPr lang="en-US" smtClean="0"/>
-              <a:t>9/14/2023</a:t>
+              <a:t>9/15/2023</a:t>
             </a:fld>
             <a:endParaRPr lang="en-US"/>
           </a:p>
@@ -1298,7 +1298,7 @@
           <a:p>
             <a:fld id="{73C3BD54-29B9-3D42-B178-776ED395AA85}" type="datetimeFigureOut">
               <a:rPr lang="en-US" smtClean="0"/>
-              <a:t>9/14/2023</a:t>
+              <a:t>9/15/2023</a:t>
             </a:fld>
             <a:endParaRPr lang="en-US"/>
           </a:p>
@@ -1566,7 +1566,7 @@
           <a:p>
             <a:fld id="{73C3BD54-29B9-3D42-B178-776ED395AA85}" type="datetimeFigureOut">
               <a:rPr lang="en-US" smtClean="0"/>
-              <a:t>9/14/2023</a:t>
+              <a:t>9/15/2023</a:t>
             </a:fld>
             <a:endParaRPr lang="en-US"/>
           </a:p>
@@ -1981,7 +1981,7 @@
           <a:p>
             <a:fld id="{73C3BD54-29B9-3D42-B178-776ED395AA85}" type="datetimeFigureOut">
               <a:rPr lang="en-US" smtClean="0"/>
-              <a:t>9/14/2023</a:t>
+              <a:t>9/15/2023</a:t>
             </a:fld>
             <a:endParaRPr lang="en-US"/>
           </a:p>
@@ -2123,7 +2123,7 @@
           <a:p>
             <a:fld id="{73C3BD54-29B9-3D42-B178-776ED395AA85}" type="datetimeFigureOut">
               <a:rPr lang="en-US" smtClean="0"/>
-              <a:t>9/14/2023</a:t>
+              <a:t>9/15/2023</a:t>
             </a:fld>
             <a:endParaRPr lang="en-US"/>
           </a:p>
@@ -2236,7 +2236,7 @@
           <a:p>
             <a:fld id="{73C3BD54-29B9-3D42-B178-776ED395AA85}" type="datetimeFigureOut">
               <a:rPr lang="en-US" smtClean="0"/>
-              <a:t>9/14/2023</a:t>
+              <a:t>9/15/2023</a:t>
             </a:fld>
             <a:endParaRPr lang="en-US"/>
           </a:p>
@@ -2549,7 +2549,7 @@
           <a:p>
             <a:fld id="{73C3BD54-29B9-3D42-B178-776ED395AA85}" type="datetimeFigureOut">
               <a:rPr lang="en-US" smtClean="0"/>
-              <a:t>9/14/2023</a:t>
+              <a:t>9/15/2023</a:t>
             </a:fld>
             <a:endParaRPr lang="en-US"/>
           </a:p>
@@ -2838,7 +2838,7 @@
           <a:p>
             <a:fld id="{73C3BD54-29B9-3D42-B178-776ED395AA85}" type="datetimeFigureOut">
               <a:rPr lang="en-US" smtClean="0"/>
-              <a:t>9/14/2023</a:t>
+              <a:t>9/15/2023</a:t>
             </a:fld>
             <a:endParaRPr lang="en-US"/>
           </a:p>
@@ -3082,7 +3082,7 @@
             <a:fld id="{73C3BD54-29B9-3D42-B178-776ED395AA85}" type="datetimeFigureOut">
               <a:rPr lang="en-US" smtClean="0"/>
               <a:pPr/>
-              <a:t>9/14/2023</a:t>
+              <a:t>9/15/2023</a:t>
             </a:fld>
             <a:endParaRPr lang="en-US" dirty="0"/>
           </a:p>
@@ -5165,6 +5165,32 @@
           </a:p>
           <a:p>
             <a:r>
+              <a:rPr lang="es-MX" sz="1800" dirty="0">
+                <a:highlight>
+                  <a:srgbClr val="00FF00"/>
+                </a:highlight>
+              </a:rPr>
+              <a:t>Pasar </a:t>
+            </a:r>
+            <a:r>
+              <a:rPr lang="es-MX" sz="1800" dirty="0" err="1">
+                <a:highlight>
+                  <a:srgbClr val="00FF00"/>
+                </a:highlight>
+              </a:rPr>
+              <a:t>info</a:t>
+            </a:r>
+            <a:r>
+              <a:rPr lang="es-MX" sz="1800" dirty="0">
+                <a:highlight>
+                  <a:srgbClr val="00FF00"/>
+                </a:highlight>
+              </a:rPr>
+              <a:t> PX4 a Andres </a:t>
+            </a:r>
+          </a:p>
+          <a:p>
+            <a:r>
               <a:rPr lang="es-MX" sz="1800" dirty="0"/>
               <a:t>Pasar </a:t>
             </a:r>
@@ -5174,26 +5200,16 @@
             </a:r>
             <a:r>
               <a:rPr lang="es-MX" sz="1800" dirty="0"/>
-              <a:t> PX4 a Andres </a:t>
-            </a:r>
-          </a:p>
-          <a:p>
-            <a:r>
-              <a:rPr lang="es-MX" sz="1800" dirty="0"/>
-              <a:t>Pasar </a:t>
-            </a:r>
-            <a:r>
-              <a:rPr lang="es-MX" sz="1800" dirty="0" err="1"/>
-              <a:t>info</a:t>
-            </a:r>
-            <a:r>
-              <a:rPr lang="es-MX" sz="1800" dirty="0"/>
               <a:t> y repo pagina a Bryan </a:t>
             </a:r>
           </a:p>
           <a:p>
             <a:r>
-              <a:rPr lang="es-MX" sz="1800" dirty="0"/>
+              <a:rPr lang="es-MX" sz="1800" dirty="0">
+                <a:highlight>
+                  <a:srgbClr val="00FF00"/>
+                </a:highlight>
+              </a:rPr>
               <a:t>Pasar información de MCU a Luis </a:t>
             </a:r>
           </a:p>

</xml_diff>

<commit_message>
Actualización de minutas de la reunion 1
</commit_message>
<xml_diff>
--- a/Documentos/Administración de Proyecto/01 - Reunion 11 sep 23 - Kick off & role definition.pptx
+++ b/Documentos/Administración de Proyecto/01 - Reunion 11 sep 23 - Kick off & role definition.pptx
@@ -132,7 +132,7 @@
   <pc:docChgLst>
     <pc:chgData name="Campos-Chavez, Carlos" userId="af2eaea1-5597-4de4-bd71-3505bc9091f0" providerId="ADAL" clId="{3FC90BC9-4C01-4FC5-8CB4-F2C74B9152B3}"/>
     <pc:docChg chg="undo custSel addSld modSld sldOrd">
-      <pc:chgData name="Campos-Chavez, Carlos" userId="af2eaea1-5597-4de4-bd71-3505bc9091f0" providerId="ADAL" clId="{3FC90BC9-4C01-4FC5-8CB4-F2C74B9152B3}" dt="2023-09-15T17:26:59.379" v="617" actId="13926"/>
+      <pc:chgData name="Campos-Chavez, Carlos" userId="af2eaea1-5597-4de4-bd71-3505bc9091f0" providerId="ADAL" clId="{3FC90BC9-4C01-4FC5-8CB4-F2C74B9152B3}" dt="2023-09-15T19:59:06.458" v="646" actId="13926"/>
       <pc:docMkLst>
         <pc:docMk/>
       </pc:docMkLst>
@@ -235,7 +235,7 @@
         </pc:spChg>
       </pc:sldChg>
       <pc:sldChg chg="modSp add mod">
-        <pc:chgData name="Campos-Chavez, Carlos" userId="af2eaea1-5597-4de4-bd71-3505bc9091f0" providerId="ADAL" clId="{3FC90BC9-4C01-4FC5-8CB4-F2C74B9152B3}" dt="2023-09-15T17:26:59.379" v="617" actId="13926"/>
+        <pc:chgData name="Campos-Chavez, Carlos" userId="af2eaea1-5597-4de4-bd71-3505bc9091f0" providerId="ADAL" clId="{3FC90BC9-4C01-4FC5-8CB4-F2C74B9152B3}" dt="2023-09-15T19:59:06.458" v="646" actId="13926"/>
         <pc:sldMkLst>
           <pc:docMk/>
           <pc:sldMk cId="2461975162" sldId="263"/>
@@ -249,7 +249,7 @@
           </ac:spMkLst>
         </pc:spChg>
         <pc:spChg chg="mod">
-          <ac:chgData name="Campos-Chavez, Carlos" userId="af2eaea1-5597-4de4-bd71-3505bc9091f0" providerId="ADAL" clId="{3FC90BC9-4C01-4FC5-8CB4-F2C74B9152B3}" dt="2023-09-15T17:26:59.379" v="617" actId="13926"/>
+          <ac:chgData name="Campos-Chavez, Carlos" userId="af2eaea1-5597-4de4-bd71-3505bc9091f0" providerId="ADAL" clId="{3FC90BC9-4C01-4FC5-8CB4-F2C74B9152B3}" dt="2023-09-15T19:59:06.458" v="646" actId="13926"/>
           <ac:spMkLst>
             <pc:docMk/>
             <pc:sldMk cId="2461975162" sldId="263"/>
@@ -5191,42 +5191,70 @@
           </a:p>
           <a:p>
             <a:r>
-              <a:rPr lang="es-MX" sz="1800" dirty="0"/>
-              <a:t>Pasar </a:t>
-            </a:r>
-            <a:r>
-              <a:rPr lang="es-MX" sz="1800" dirty="0" err="1"/>
-              <a:t>info</a:t>
-            </a:r>
-            <a:r>
-              <a:rPr lang="es-MX" sz="1800" dirty="0"/>
-              <a:t> y repo pagina a Bryan </a:t>
-            </a:r>
-          </a:p>
-          <a:p>
-            <a:r>
               <a:rPr lang="es-MX" sz="1800" dirty="0">
                 <a:highlight>
                   <a:srgbClr val="00FF00"/>
                 </a:highlight>
               </a:rPr>
+              <a:t>Pasar </a:t>
+            </a:r>
+            <a:r>
+              <a:rPr lang="es-MX" sz="1800" dirty="0" err="1">
+                <a:highlight>
+                  <a:srgbClr val="00FF00"/>
+                </a:highlight>
+              </a:rPr>
+              <a:t>info</a:t>
+            </a:r>
+            <a:r>
+              <a:rPr lang="es-MX" sz="1800" dirty="0">
+                <a:highlight>
+                  <a:srgbClr val="00FF00"/>
+                </a:highlight>
+              </a:rPr>
+              <a:t> y repo pagina a Bryan – va a comenzar una nueva</a:t>
+            </a:r>
+          </a:p>
+          <a:p>
+            <a:r>
+              <a:rPr lang="es-MX" sz="1800" dirty="0">
+                <a:highlight>
+                  <a:srgbClr val="00FF00"/>
+                </a:highlight>
+              </a:rPr>
               <a:t>Pasar información de MCU a Luis </a:t>
             </a:r>
           </a:p>
           <a:p>
             <a:r>
-              <a:rPr lang="es-MX" sz="1800" dirty="0"/>
+              <a:rPr lang="es-MX" sz="1800" dirty="0">
+                <a:highlight>
+                  <a:srgbClr val="FFFF00"/>
+                </a:highlight>
+              </a:rPr>
               <a:t>Ver con Gabo el diseño de los dispositivos de muestreo y de </a:t>
             </a:r>
             <a:r>
-              <a:rPr lang="es-MX" sz="1800" dirty="0" err="1"/>
+              <a:rPr lang="es-MX" sz="1800" dirty="0" err="1">
+                <a:highlight>
+                  <a:srgbClr val="FFFF00"/>
+                </a:highlight>
+              </a:rPr>
               <a:t>sensado</a:t>
             </a:r>
-            <a:endParaRPr lang="es-MX" sz="1800" dirty="0"/>
-          </a:p>
-          <a:p>
-            <a:r>
-              <a:rPr lang="es-MX" sz="1800" dirty="0"/>
+            <a:endParaRPr lang="es-MX" sz="1800" dirty="0">
+              <a:highlight>
+                <a:srgbClr val="FFFF00"/>
+              </a:highlight>
+            </a:endParaRPr>
+          </a:p>
+          <a:p>
+            <a:r>
+              <a:rPr lang="es-MX" sz="1800" dirty="0">
+                <a:highlight>
+                  <a:srgbClr val="00FF00"/>
+                </a:highlight>
+              </a:rPr>
               <a:t>Re organizar Excel de gastos para pasar a Quiroz</a:t>
             </a:r>
           </a:p>

</xml_diff>